<commit_message>
* Dualsoft : Expression -> XG5000 qtx format exporter
</commit_message>
<xml_diff>
--- a/Documents/특수 출력.pptx
+++ b/Documents/특수 출력.pptx
@@ -5,7 +5,7 @@
     <p:sldMasterId id="2147483648" r:id="rId1"/>
   </p:sldMasterIdLst>
   <p:notesMasterIdLst>
-    <p:notesMasterId r:id="rId13"/>
+    <p:notesMasterId r:id="rId15"/>
   </p:notesMasterIdLst>
   <p:sldIdLst>
     <p:sldId id="256" r:id="rId2"/>
@@ -19,6 +19,8 @@
     <p:sldId id="260" r:id="rId10"/>
     <p:sldId id="262" r:id="rId11"/>
     <p:sldId id="257" r:id="rId12"/>
+    <p:sldId id="267" r:id="rId13"/>
+    <p:sldId id="268" r:id="rId14"/>
   </p:sldIdLst>
   <p:sldSz cx="12192000" cy="6858000"/>
   <p:notesSz cx="6858000" cy="9144000"/>
@@ -207,7 +209,7 @@
           <a:p>
             <a:fld id="{0B9EDBCA-C23C-4286-A03F-8A582BCD0041}" type="datetimeFigureOut">
               <a:rPr lang="ko-KR" altLang="en-US" smtClean="0"/>
-              <a:t>2019-11-01</a:t>
+              <a:t>2019-11-29</a:t>
             </a:fld>
             <a:endParaRPr lang="ko-KR" altLang="en-US"/>
           </a:p>
@@ -733,7 +735,7 @@
           <a:p>
             <a:fld id="{08D318FC-9F3D-43DF-B83B-9D3E3F63DD10}" type="datetimeFigureOut">
               <a:rPr lang="ko-KR" altLang="en-US" smtClean="0"/>
-              <a:t>2019-11-01</a:t>
+              <a:t>2019-11-29</a:t>
             </a:fld>
             <a:endParaRPr lang="ko-KR" altLang="en-US"/>
           </a:p>
@@ -931,7 +933,7 @@
           <a:p>
             <a:fld id="{08D318FC-9F3D-43DF-B83B-9D3E3F63DD10}" type="datetimeFigureOut">
               <a:rPr lang="ko-KR" altLang="en-US" smtClean="0"/>
-              <a:t>2019-11-01</a:t>
+              <a:t>2019-11-29</a:t>
             </a:fld>
             <a:endParaRPr lang="ko-KR" altLang="en-US"/>
           </a:p>
@@ -1139,7 +1141,7 @@
           <a:p>
             <a:fld id="{08D318FC-9F3D-43DF-B83B-9D3E3F63DD10}" type="datetimeFigureOut">
               <a:rPr lang="ko-KR" altLang="en-US" smtClean="0"/>
-              <a:t>2019-11-01</a:t>
+              <a:t>2019-11-29</a:t>
             </a:fld>
             <a:endParaRPr lang="ko-KR" altLang="en-US"/>
           </a:p>
@@ -1337,7 +1339,7 @@
           <a:p>
             <a:fld id="{08D318FC-9F3D-43DF-B83B-9D3E3F63DD10}" type="datetimeFigureOut">
               <a:rPr lang="ko-KR" altLang="en-US" smtClean="0"/>
-              <a:t>2019-11-01</a:t>
+              <a:t>2019-11-29</a:t>
             </a:fld>
             <a:endParaRPr lang="ko-KR" altLang="en-US"/>
           </a:p>
@@ -1612,7 +1614,7 @@
           <a:p>
             <a:fld id="{08D318FC-9F3D-43DF-B83B-9D3E3F63DD10}" type="datetimeFigureOut">
               <a:rPr lang="ko-KR" altLang="en-US" smtClean="0"/>
-              <a:t>2019-11-01</a:t>
+              <a:t>2019-11-29</a:t>
             </a:fld>
             <a:endParaRPr lang="ko-KR" altLang="en-US"/>
           </a:p>
@@ -1877,7 +1879,7 @@
           <a:p>
             <a:fld id="{08D318FC-9F3D-43DF-B83B-9D3E3F63DD10}" type="datetimeFigureOut">
               <a:rPr lang="ko-KR" altLang="en-US" smtClean="0"/>
-              <a:t>2019-11-01</a:t>
+              <a:t>2019-11-29</a:t>
             </a:fld>
             <a:endParaRPr lang="ko-KR" altLang="en-US"/>
           </a:p>
@@ -2289,7 +2291,7 @@
           <a:p>
             <a:fld id="{08D318FC-9F3D-43DF-B83B-9D3E3F63DD10}" type="datetimeFigureOut">
               <a:rPr lang="ko-KR" altLang="en-US" smtClean="0"/>
-              <a:t>2019-11-01</a:t>
+              <a:t>2019-11-29</a:t>
             </a:fld>
             <a:endParaRPr lang="ko-KR" altLang="en-US"/>
           </a:p>
@@ -2430,7 +2432,7 @@
           <a:p>
             <a:fld id="{08D318FC-9F3D-43DF-B83B-9D3E3F63DD10}" type="datetimeFigureOut">
               <a:rPr lang="ko-KR" altLang="en-US" smtClean="0"/>
-              <a:t>2019-11-01</a:t>
+              <a:t>2019-11-29</a:t>
             </a:fld>
             <a:endParaRPr lang="ko-KR" altLang="en-US"/>
           </a:p>
@@ -2543,7 +2545,7 @@
           <a:p>
             <a:fld id="{08D318FC-9F3D-43DF-B83B-9D3E3F63DD10}" type="datetimeFigureOut">
               <a:rPr lang="ko-KR" altLang="en-US" smtClean="0"/>
-              <a:t>2019-11-01</a:t>
+              <a:t>2019-11-29</a:t>
             </a:fld>
             <a:endParaRPr lang="ko-KR" altLang="en-US"/>
           </a:p>
@@ -2854,7 +2856,7 @@
           <a:p>
             <a:fld id="{08D318FC-9F3D-43DF-B83B-9D3E3F63DD10}" type="datetimeFigureOut">
               <a:rPr lang="ko-KR" altLang="en-US" smtClean="0"/>
-              <a:t>2019-11-01</a:t>
+              <a:t>2019-11-29</a:t>
             </a:fld>
             <a:endParaRPr lang="ko-KR" altLang="en-US"/>
           </a:p>
@@ -3142,7 +3144,7 @@
           <a:p>
             <a:fld id="{08D318FC-9F3D-43DF-B83B-9D3E3F63DD10}" type="datetimeFigureOut">
               <a:rPr lang="ko-KR" altLang="en-US" smtClean="0"/>
-              <a:t>2019-11-01</a:t>
+              <a:t>2019-11-29</a:t>
             </a:fld>
             <a:endParaRPr lang="ko-KR" altLang="en-US"/>
           </a:p>
@@ -3383,7 +3385,7 @@
           <a:p>
             <a:fld id="{08D318FC-9F3D-43DF-B83B-9D3E3F63DD10}" type="datetimeFigureOut">
               <a:rPr lang="ko-KR" altLang="en-US" smtClean="0"/>
-              <a:t>2019-11-01</a:t>
+              <a:t>2019-11-29</a:t>
             </a:fld>
             <a:endParaRPr lang="ko-KR" altLang="en-US"/>
           </a:p>
@@ -4070,6 +4072,333 @@
     <p:extLst>
       <p:ext uri="{BB962C8B-B14F-4D97-AF65-F5344CB8AC3E}">
         <p14:creationId xmlns:p14="http://schemas.microsoft.com/office/powerpoint/2010/main" val="4252920206"/>
+      </p:ext>
+    </p:extLst>
+  </p:cSld>
+  <p:clrMapOvr>
+    <a:masterClrMapping/>
+  </p:clrMapOvr>
+</p:sld>
+</file>
+
+<file path=ppt/slides/slide12.xml><?xml version="1.0" encoding="utf-8"?>
+<p:sld xmlns:a="http://schemas.openxmlformats.org/drawingml/2006/main" xmlns:r="http://schemas.openxmlformats.org/officeDocument/2006/relationships" xmlns:p="http://schemas.openxmlformats.org/presentationml/2006/main">
+  <p:cSld>
+    <p:spTree>
+      <p:nvGrpSpPr>
+        <p:cNvPr id="1" name=""/>
+        <p:cNvGrpSpPr/>
+        <p:nvPr/>
+      </p:nvGrpSpPr>
+      <p:grpSpPr>
+        <a:xfrm>
+          <a:off x="0" y="0"/>
+          <a:ext cx="0" cy="0"/>
+          <a:chOff x="0" y="0"/>
+          <a:chExt cx="0" cy="0"/>
+        </a:xfrm>
+      </p:grpSpPr>
+      <p:sp>
+        <p:nvSpPr>
+          <p:cNvPr id="2" name="제목 1">
+            <a:extLst>
+              <a:ext uri="{FF2B5EF4-FFF2-40B4-BE49-F238E27FC236}">
+                <a16:creationId xmlns:a16="http://schemas.microsoft.com/office/drawing/2014/main" id="{B97B5C75-999C-43C7-A7A4-B12B55FFACCC}"/>
+              </a:ext>
+            </a:extLst>
+          </p:cNvPr>
+          <p:cNvSpPr>
+            <a:spLocks noGrp="1"/>
+          </p:cNvSpPr>
+          <p:nvPr>
+            <p:ph type="title"/>
+          </p:nvPr>
+        </p:nvSpPr>
+        <p:spPr/>
+        <p:txBody>
+          <a:bodyPr/>
+          <a:lstStyle/>
+          <a:p>
+            <a:r>
+              <a:rPr lang="en-US" altLang="ko-KR" dirty="0"/>
+              <a:t>BSET</a:t>
+            </a:r>
+            <a:endParaRPr lang="ko-KR" altLang="en-US" dirty="0"/>
+          </a:p>
+        </p:txBody>
+      </p:sp>
+      <p:sp>
+        <p:nvSpPr>
+          <p:cNvPr id="3" name="내용 개체 틀 2">
+            <a:extLst>
+              <a:ext uri="{FF2B5EF4-FFF2-40B4-BE49-F238E27FC236}">
+                <a16:creationId xmlns:a16="http://schemas.microsoft.com/office/drawing/2014/main" id="{AAD63BF9-7246-4B27-A0F9-1237DA2DBB5C}"/>
+              </a:ext>
+            </a:extLst>
+          </p:cNvPr>
+          <p:cNvSpPr>
+            <a:spLocks noGrp="1"/>
+          </p:cNvSpPr>
+          <p:nvPr>
+            <p:ph idx="1"/>
+          </p:nvPr>
+        </p:nvSpPr>
+        <p:spPr>
+          <a:xfrm>
+            <a:off x="9863190" y="1825625"/>
+            <a:ext cx="1490609" cy="4351338"/>
+          </a:xfrm>
+        </p:spPr>
+        <p:txBody>
+          <a:bodyPr/>
+          <a:lstStyle/>
+          <a:p>
+            <a:endParaRPr lang="ko-KR" altLang="en-US" dirty="0"/>
+          </a:p>
+        </p:txBody>
+      </p:sp>
+      <p:pic>
+        <p:nvPicPr>
+          <p:cNvPr id="4" name="그림 3">
+            <a:extLst>
+              <a:ext uri="{FF2B5EF4-FFF2-40B4-BE49-F238E27FC236}">
+                <a16:creationId xmlns:a16="http://schemas.microsoft.com/office/drawing/2014/main" id="{F4AEB79B-6D26-4C4D-8BC2-2D334089A5B4}"/>
+              </a:ext>
+            </a:extLst>
+          </p:cNvPr>
+          <p:cNvPicPr>
+            <a:picLocks noChangeAspect="1"/>
+          </p:cNvPicPr>
+          <p:nvPr/>
+        </p:nvPicPr>
+        <p:blipFill>
+          <a:blip r:embed="rId2"/>
+          <a:stretch>
+            <a:fillRect/>
+          </a:stretch>
+        </p:blipFill>
+        <p:spPr>
+          <a:xfrm>
+            <a:off x="838201" y="1825625"/>
+            <a:ext cx="2685630" cy="1747892"/>
+          </a:xfrm>
+          <a:prstGeom prst="rect">
+            <a:avLst/>
+          </a:prstGeom>
+        </p:spPr>
+      </p:pic>
+    </p:spTree>
+    <p:extLst>
+      <p:ext uri="{BB962C8B-B14F-4D97-AF65-F5344CB8AC3E}">
+        <p14:creationId xmlns:p14="http://schemas.microsoft.com/office/powerpoint/2010/main" val="2365190255"/>
+      </p:ext>
+    </p:extLst>
+  </p:cSld>
+  <p:clrMapOvr>
+    <a:masterClrMapping/>
+  </p:clrMapOvr>
+</p:sld>
+</file>
+
+<file path=ppt/slides/slide13.xml><?xml version="1.0" encoding="utf-8"?>
+<p:sld xmlns:a="http://schemas.openxmlformats.org/drawingml/2006/main" xmlns:r="http://schemas.openxmlformats.org/officeDocument/2006/relationships" xmlns:p="http://schemas.openxmlformats.org/presentationml/2006/main">
+  <p:cSld>
+    <p:spTree>
+      <p:nvGrpSpPr>
+        <p:cNvPr id="1" name=""/>
+        <p:cNvGrpSpPr/>
+        <p:nvPr/>
+      </p:nvGrpSpPr>
+      <p:grpSpPr>
+        <a:xfrm>
+          <a:off x="0" y="0"/>
+          <a:ext cx="0" cy="0"/>
+          <a:chOff x="0" y="0"/>
+          <a:chExt cx="0" cy="0"/>
+        </a:xfrm>
+      </p:grpSpPr>
+      <p:sp>
+        <p:nvSpPr>
+          <p:cNvPr id="2" name="제목 1">
+            <a:extLst>
+              <a:ext uri="{FF2B5EF4-FFF2-40B4-BE49-F238E27FC236}">
+                <a16:creationId xmlns:a16="http://schemas.microsoft.com/office/drawing/2014/main" id="{78A3B718-B22F-4D52-BBC2-48D76A54A1BC}"/>
+              </a:ext>
+            </a:extLst>
+          </p:cNvPr>
+          <p:cNvSpPr>
+            <a:spLocks noGrp="1"/>
+          </p:cNvSpPr>
+          <p:nvPr>
+            <p:ph type="title"/>
+          </p:nvPr>
+        </p:nvSpPr>
+        <p:spPr>
+          <a:xfrm>
+            <a:off x="0" y="-294093"/>
+            <a:ext cx="10515600" cy="1325563"/>
+          </a:xfrm>
+        </p:spPr>
+        <p:txBody>
+          <a:bodyPr/>
+          <a:lstStyle/>
+          <a:p>
+            <a:r>
+              <a:rPr lang="en-US" altLang="ko-KR" dirty="0"/>
+              <a:t>MID$ : </a:t>
+            </a:r>
+            <a:r>
+              <a:rPr lang="ko-KR" altLang="en-US" dirty="0"/>
+              <a:t>변환</a:t>
+            </a:r>
+            <a:r>
+              <a:rPr lang="en-US" altLang="ko-KR" dirty="0"/>
+              <a:t> </a:t>
+            </a:r>
+            <a:r>
+              <a:rPr lang="ko-KR" altLang="en-US" dirty="0"/>
+              <a:t>불가</a:t>
+            </a:r>
+            <a:r>
+              <a:rPr lang="en-US" altLang="ko-KR" dirty="0"/>
+              <a:t>.  S2 </a:t>
+            </a:r>
+            <a:r>
+              <a:rPr lang="ko-KR" altLang="en-US" dirty="0"/>
+              <a:t>가 간접지정</a:t>
+            </a:r>
+          </a:p>
+        </p:txBody>
+      </p:sp>
+      <p:pic>
+        <p:nvPicPr>
+          <p:cNvPr id="4" name="그림 3">
+            <a:extLst>
+              <a:ext uri="{FF2B5EF4-FFF2-40B4-BE49-F238E27FC236}">
+                <a16:creationId xmlns:a16="http://schemas.microsoft.com/office/drawing/2014/main" id="{7BDC46E9-2C60-4C14-856E-345CE61637CF}"/>
+              </a:ext>
+            </a:extLst>
+          </p:cNvPr>
+          <p:cNvPicPr>
+            <a:picLocks noChangeAspect="1"/>
+          </p:cNvPicPr>
+          <p:nvPr/>
+        </p:nvPicPr>
+        <p:blipFill>
+          <a:blip r:embed="rId2"/>
+          <a:stretch>
+            <a:fillRect/>
+          </a:stretch>
+        </p:blipFill>
+        <p:spPr>
+          <a:xfrm>
+            <a:off x="0" y="598721"/>
+            <a:ext cx="7260760" cy="2669876"/>
+          </a:xfrm>
+          <a:prstGeom prst="rect">
+            <a:avLst/>
+          </a:prstGeom>
+        </p:spPr>
+      </p:pic>
+      <p:pic>
+        <p:nvPicPr>
+          <p:cNvPr id="5" name="그림 4">
+            <a:extLst>
+              <a:ext uri="{FF2B5EF4-FFF2-40B4-BE49-F238E27FC236}">
+                <a16:creationId xmlns:a16="http://schemas.microsoft.com/office/drawing/2014/main" id="{4D9C18C8-0B8F-44E0-B3CF-26D514681A2C}"/>
+              </a:ext>
+            </a:extLst>
+          </p:cNvPr>
+          <p:cNvPicPr>
+            <a:picLocks noChangeAspect="1"/>
+          </p:cNvPicPr>
+          <p:nvPr/>
+        </p:nvPicPr>
+        <p:blipFill>
+          <a:blip r:embed="rId3"/>
+          <a:stretch>
+            <a:fillRect/>
+          </a:stretch>
+        </p:blipFill>
+        <p:spPr>
+          <a:xfrm>
+            <a:off x="5765157" y="1924284"/>
+            <a:ext cx="6246046" cy="4899654"/>
+          </a:xfrm>
+          <a:prstGeom prst="rect">
+            <a:avLst/>
+          </a:prstGeom>
+        </p:spPr>
+      </p:pic>
+      <p:sp>
+        <p:nvSpPr>
+          <p:cNvPr id="6" name="TextBox 5">
+            <a:extLst>
+              <a:ext uri="{FF2B5EF4-FFF2-40B4-BE49-F238E27FC236}">
+                <a16:creationId xmlns:a16="http://schemas.microsoft.com/office/drawing/2014/main" id="{57DA658F-DB4A-4AEF-80ED-3648FE52B144}"/>
+              </a:ext>
+            </a:extLst>
+          </p:cNvPr>
+          <p:cNvSpPr txBox="1"/>
+          <p:nvPr/>
+        </p:nvSpPr>
+        <p:spPr>
+          <a:xfrm>
+            <a:off x="683623" y="3971109"/>
+            <a:ext cx="4389343" cy="923330"/>
+          </a:xfrm>
+          <a:prstGeom prst="rect">
+            <a:avLst/>
+          </a:prstGeom>
+          <a:noFill/>
+        </p:spPr>
+        <p:txBody>
+          <a:bodyPr wrap="none" rtlCol="0">
+            <a:spAutoFit/>
+          </a:bodyPr>
+          <a:lstStyle/>
+          <a:p>
+            <a:r>
+              <a:rPr lang="ko-KR" altLang="en-US" dirty="0"/>
+              <a:t>임시 버퍼에 산전의 </a:t>
+            </a:r>
+            <a:r>
+              <a:rPr lang="en-US" altLang="ko-KR" dirty="0"/>
+              <a:t>S2 </a:t>
+            </a:r>
+            <a:r>
+              <a:rPr lang="ko-KR" altLang="en-US" dirty="0"/>
+              <a:t>에 해당하는 값을</a:t>
+            </a:r>
+            <a:endParaRPr lang="en-US" altLang="ko-KR" dirty="0"/>
+          </a:p>
+          <a:p>
+            <a:r>
+              <a:rPr lang="ko-KR" altLang="en-US" dirty="0"/>
+              <a:t>쓸 수도 있으나</a:t>
+            </a:r>
+            <a:r>
+              <a:rPr lang="en-US" altLang="ko-KR" dirty="0"/>
+              <a:t>… </a:t>
+            </a:r>
+            <a:r>
+              <a:rPr lang="ko-KR" altLang="en-US" dirty="0"/>
+              <a:t>좀 번거로움</a:t>
+            </a:r>
+            <a:r>
+              <a:rPr lang="en-US" altLang="ko-KR" dirty="0"/>
+              <a:t>.</a:t>
+            </a:r>
+          </a:p>
+          <a:p>
+            <a:endParaRPr lang="en-US" altLang="ko-KR" dirty="0"/>
+          </a:p>
+        </p:txBody>
+      </p:sp>
+    </p:spTree>
+    <p:extLst>
+      <p:ext uri="{BB962C8B-B14F-4D97-AF65-F5344CB8AC3E}">
+        <p14:creationId xmlns:p14="http://schemas.microsoft.com/office/powerpoint/2010/main" val="1637705206"/>
       </p:ext>
     </p:extLst>
   </p:cSld>

</xml_diff>

<commit_message>
- LSIS 옴론 PLC 변환기
</commit_message>
<xml_diff>
--- a/Documents/특수 출력.pptx
+++ b/Documents/특수 출력.pptx
@@ -5,7 +5,7 @@
     <p:sldMasterId id="2147483648" r:id="rId1"/>
   </p:sldMasterIdLst>
   <p:notesMasterIdLst>
-    <p:notesMasterId r:id="rId15"/>
+    <p:notesMasterId r:id="rId16"/>
   </p:notesMasterIdLst>
   <p:sldIdLst>
     <p:sldId id="256" r:id="rId2"/>
@@ -16,11 +16,12 @@
     <p:sldId id="258" r:id="rId7"/>
     <p:sldId id="259" r:id="rId8"/>
     <p:sldId id="261" r:id="rId9"/>
-    <p:sldId id="260" r:id="rId10"/>
-    <p:sldId id="262" r:id="rId11"/>
-    <p:sldId id="257" r:id="rId12"/>
-    <p:sldId id="267" r:id="rId13"/>
-    <p:sldId id="268" r:id="rId14"/>
+    <p:sldId id="269" r:id="rId10"/>
+    <p:sldId id="260" r:id="rId11"/>
+    <p:sldId id="262" r:id="rId12"/>
+    <p:sldId id="257" r:id="rId13"/>
+    <p:sldId id="267" r:id="rId14"/>
+    <p:sldId id="268" r:id="rId15"/>
   </p:sldIdLst>
   <p:sldSz cx="12192000" cy="6858000"/>
   <p:notesSz cx="6858000" cy="9144000"/>
@@ -209,7 +210,7 @@
           <a:p>
             <a:fld id="{0B9EDBCA-C23C-4286-A03F-8A582BCD0041}" type="datetimeFigureOut">
               <a:rPr lang="ko-KR" altLang="en-US" smtClean="0"/>
-              <a:t>2019-11-29</a:t>
+              <a:t>2020-01-03</a:t>
             </a:fld>
             <a:endParaRPr lang="ko-KR" altLang="en-US"/>
           </a:p>
@@ -569,7 +570,7 @@
           <a:p>
             <a:fld id="{080C1051-1DAB-4CF2-AA59-CEC515E7909F}" type="slidenum">
               <a:rPr lang="ko-KR" altLang="en-US" smtClean="0"/>
-              <a:t>10</a:t>
+              <a:t>11</a:t>
             </a:fld>
             <a:endParaRPr lang="ko-KR" altLang="en-US"/>
           </a:p>
@@ -735,7 +736,7 @@
           <a:p>
             <a:fld id="{08D318FC-9F3D-43DF-B83B-9D3E3F63DD10}" type="datetimeFigureOut">
               <a:rPr lang="ko-KR" altLang="en-US" smtClean="0"/>
-              <a:t>2019-11-29</a:t>
+              <a:t>2020-01-03</a:t>
             </a:fld>
             <a:endParaRPr lang="ko-KR" altLang="en-US"/>
           </a:p>
@@ -933,7 +934,7 @@
           <a:p>
             <a:fld id="{08D318FC-9F3D-43DF-B83B-9D3E3F63DD10}" type="datetimeFigureOut">
               <a:rPr lang="ko-KR" altLang="en-US" smtClean="0"/>
-              <a:t>2019-11-29</a:t>
+              <a:t>2020-01-03</a:t>
             </a:fld>
             <a:endParaRPr lang="ko-KR" altLang="en-US"/>
           </a:p>
@@ -1141,7 +1142,7 @@
           <a:p>
             <a:fld id="{08D318FC-9F3D-43DF-B83B-9D3E3F63DD10}" type="datetimeFigureOut">
               <a:rPr lang="ko-KR" altLang="en-US" smtClean="0"/>
-              <a:t>2019-11-29</a:t>
+              <a:t>2020-01-03</a:t>
             </a:fld>
             <a:endParaRPr lang="ko-KR" altLang="en-US"/>
           </a:p>
@@ -1339,7 +1340,7 @@
           <a:p>
             <a:fld id="{08D318FC-9F3D-43DF-B83B-9D3E3F63DD10}" type="datetimeFigureOut">
               <a:rPr lang="ko-KR" altLang="en-US" smtClean="0"/>
-              <a:t>2019-11-29</a:t>
+              <a:t>2020-01-03</a:t>
             </a:fld>
             <a:endParaRPr lang="ko-KR" altLang="en-US"/>
           </a:p>
@@ -1614,7 +1615,7 @@
           <a:p>
             <a:fld id="{08D318FC-9F3D-43DF-B83B-9D3E3F63DD10}" type="datetimeFigureOut">
               <a:rPr lang="ko-KR" altLang="en-US" smtClean="0"/>
-              <a:t>2019-11-29</a:t>
+              <a:t>2020-01-03</a:t>
             </a:fld>
             <a:endParaRPr lang="ko-KR" altLang="en-US"/>
           </a:p>
@@ -1879,7 +1880,7 @@
           <a:p>
             <a:fld id="{08D318FC-9F3D-43DF-B83B-9D3E3F63DD10}" type="datetimeFigureOut">
               <a:rPr lang="ko-KR" altLang="en-US" smtClean="0"/>
-              <a:t>2019-11-29</a:t>
+              <a:t>2020-01-03</a:t>
             </a:fld>
             <a:endParaRPr lang="ko-KR" altLang="en-US"/>
           </a:p>
@@ -2291,7 +2292,7 @@
           <a:p>
             <a:fld id="{08D318FC-9F3D-43DF-B83B-9D3E3F63DD10}" type="datetimeFigureOut">
               <a:rPr lang="ko-KR" altLang="en-US" smtClean="0"/>
-              <a:t>2019-11-29</a:t>
+              <a:t>2020-01-03</a:t>
             </a:fld>
             <a:endParaRPr lang="ko-KR" altLang="en-US"/>
           </a:p>
@@ -2432,7 +2433,7 @@
           <a:p>
             <a:fld id="{08D318FC-9F3D-43DF-B83B-9D3E3F63DD10}" type="datetimeFigureOut">
               <a:rPr lang="ko-KR" altLang="en-US" smtClean="0"/>
-              <a:t>2019-11-29</a:t>
+              <a:t>2020-01-03</a:t>
             </a:fld>
             <a:endParaRPr lang="ko-KR" altLang="en-US"/>
           </a:p>
@@ -2545,7 +2546,7 @@
           <a:p>
             <a:fld id="{08D318FC-9F3D-43DF-B83B-9D3E3F63DD10}" type="datetimeFigureOut">
               <a:rPr lang="ko-KR" altLang="en-US" smtClean="0"/>
-              <a:t>2019-11-29</a:t>
+              <a:t>2020-01-03</a:t>
             </a:fld>
             <a:endParaRPr lang="ko-KR" altLang="en-US"/>
           </a:p>
@@ -2856,7 +2857,7 @@
           <a:p>
             <a:fld id="{08D318FC-9F3D-43DF-B83B-9D3E3F63DD10}" type="datetimeFigureOut">
               <a:rPr lang="ko-KR" altLang="en-US" smtClean="0"/>
-              <a:t>2019-11-29</a:t>
+              <a:t>2020-01-03</a:t>
             </a:fld>
             <a:endParaRPr lang="ko-KR" altLang="en-US"/>
           </a:p>
@@ -3144,7 +3145,7 @@
           <a:p>
             <a:fld id="{08D318FC-9F3D-43DF-B83B-9D3E3F63DD10}" type="datetimeFigureOut">
               <a:rPr lang="ko-KR" altLang="en-US" smtClean="0"/>
-              <a:t>2019-11-29</a:t>
+              <a:t>2020-01-03</a:t>
             </a:fld>
             <a:endParaRPr lang="ko-KR" altLang="en-US"/>
           </a:p>
@@ -3385,7 +3386,7 @@
           <a:p>
             <a:fld id="{08D318FC-9F3D-43DF-B83B-9D3E3F63DD10}" type="datetimeFigureOut">
               <a:rPr lang="ko-KR" altLang="en-US" smtClean="0"/>
-              <a:t>2019-11-29</a:t>
+              <a:t>2020-01-03</a:t>
             </a:fld>
             <a:endParaRPr lang="ko-KR" altLang="en-US"/>
           </a:p>
@@ -3887,6 +3888,189 @@
           <p:cNvPr id="2" name="제목 1">
             <a:extLst>
               <a:ext uri="{FF2B5EF4-FFF2-40B4-BE49-F238E27FC236}">
+                <a16:creationId xmlns:a16="http://schemas.microsoft.com/office/drawing/2014/main" id="{605BC0D6-6925-44AA-849C-232855F3F726}"/>
+              </a:ext>
+            </a:extLst>
+          </p:cNvPr>
+          <p:cNvSpPr>
+            <a:spLocks noGrp="1"/>
+          </p:cNvSpPr>
+          <p:nvPr>
+            <p:ph type="title"/>
+          </p:nvPr>
+        </p:nvSpPr>
+        <p:spPr/>
+        <p:txBody>
+          <a:bodyPr/>
+          <a:lstStyle/>
+          <a:p>
+            <a:r>
+              <a:rPr lang="ko-KR" altLang="en-US" dirty="0"/>
+              <a:t>비교</a:t>
+            </a:r>
+            <a:r>
+              <a:rPr lang="en-US" altLang="ko-KR" dirty="0"/>
+              <a:t>(CMP)</a:t>
+            </a:r>
+            <a:endParaRPr lang="ko-KR" altLang="en-US" dirty="0"/>
+          </a:p>
+        </p:txBody>
+      </p:sp>
+      <p:sp>
+        <p:nvSpPr>
+          <p:cNvPr id="3" name="내용 개체 틀 2">
+            <a:extLst>
+              <a:ext uri="{FF2B5EF4-FFF2-40B4-BE49-F238E27FC236}">
+                <a16:creationId xmlns:a16="http://schemas.microsoft.com/office/drawing/2014/main" id="{EC32CFC6-7010-45B5-A261-4F9AA6C929DC}"/>
+              </a:ext>
+            </a:extLst>
+          </p:cNvPr>
+          <p:cNvSpPr>
+            <a:spLocks noGrp="1"/>
+          </p:cNvSpPr>
+          <p:nvPr>
+            <p:ph idx="1"/>
+          </p:nvPr>
+        </p:nvSpPr>
+        <p:spPr>
+          <a:xfrm>
+            <a:off x="8459282" y="1825625"/>
+            <a:ext cx="2894517" cy="4351338"/>
+          </a:xfrm>
+        </p:spPr>
+        <p:txBody>
+          <a:bodyPr/>
+          <a:lstStyle/>
+          <a:p>
+            <a:endParaRPr lang="ko-KR" altLang="en-US"/>
+          </a:p>
+        </p:txBody>
+      </p:sp>
+      <p:pic>
+        <p:nvPicPr>
+          <p:cNvPr id="4" name="그림 3">
+            <a:extLst>
+              <a:ext uri="{FF2B5EF4-FFF2-40B4-BE49-F238E27FC236}">
+                <a16:creationId xmlns:a16="http://schemas.microsoft.com/office/drawing/2014/main" id="{E045C605-B63E-4D62-9DE0-50C7C2418AE0}"/>
+              </a:ext>
+            </a:extLst>
+          </p:cNvPr>
+          <p:cNvPicPr>
+            <a:picLocks noChangeAspect="1"/>
+          </p:cNvPicPr>
+          <p:nvPr/>
+        </p:nvPicPr>
+        <p:blipFill>
+          <a:blip r:embed="rId2"/>
+          <a:stretch>
+            <a:fillRect/>
+          </a:stretch>
+        </p:blipFill>
+        <p:spPr>
+          <a:xfrm>
+            <a:off x="605798" y="2113395"/>
+            <a:ext cx="6734175" cy="1428750"/>
+          </a:xfrm>
+          <a:prstGeom prst="rect">
+            <a:avLst/>
+          </a:prstGeom>
+        </p:spPr>
+      </p:pic>
+      <p:pic>
+        <p:nvPicPr>
+          <p:cNvPr id="5" name="그림 4">
+            <a:extLst>
+              <a:ext uri="{FF2B5EF4-FFF2-40B4-BE49-F238E27FC236}">
+                <a16:creationId xmlns:a16="http://schemas.microsoft.com/office/drawing/2014/main" id="{DF145771-F826-4CF9-A2AD-C2811936C010}"/>
+              </a:ext>
+            </a:extLst>
+          </p:cNvPr>
+          <p:cNvPicPr>
+            <a:picLocks noChangeAspect="1"/>
+          </p:cNvPicPr>
+          <p:nvPr/>
+        </p:nvPicPr>
+        <p:blipFill>
+          <a:blip r:embed="rId3"/>
+          <a:stretch>
+            <a:fillRect/>
+          </a:stretch>
+        </p:blipFill>
+        <p:spPr>
+          <a:xfrm>
+            <a:off x="3694340" y="3964852"/>
+            <a:ext cx="4205287" cy="2557462"/>
+          </a:xfrm>
+          <a:prstGeom prst="rect">
+            <a:avLst/>
+          </a:prstGeom>
+        </p:spPr>
+      </p:pic>
+      <p:pic>
+        <p:nvPicPr>
+          <p:cNvPr id="6" name="그림 5">
+            <a:extLst>
+              <a:ext uri="{FF2B5EF4-FFF2-40B4-BE49-F238E27FC236}">
+                <a16:creationId xmlns:a16="http://schemas.microsoft.com/office/drawing/2014/main" id="{9A23DE63-CA32-4106-B8A4-C729C522DF23}"/>
+              </a:ext>
+            </a:extLst>
+          </p:cNvPr>
+          <p:cNvPicPr>
+            <a:picLocks noChangeAspect="1"/>
+          </p:cNvPicPr>
+          <p:nvPr/>
+        </p:nvPicPr>
+        <p:blipFill>
+          <a:blip r:embed="rId4"/>
+          <a:stretch>
+            <a:fillRect/>
+          </a:stretch>
+        </p:blipFill>
+        <p:spPr>
+          <a:xfrm>
+            <a:off x="406933" y="4206584"/>
+            <a:ext cx="3007580" cy="2237783"/>
+          </a:xfrm>
+          <a:prstGeom prst="rect">
+            <a:avLst/>
+          </a:prstGeom>
+        </p:spPr>
+      </p:pic>
+    </p:spTree>
+    <p:extLst>
+      <p:ext uri="{BB962C8B-B14F-4D97-AF65-F5344CB8AC3E}">
+        <p14:creationId xmlns:p14="http://schemas.microsoft.com/office/powerpoint/2010/main" val="1094553225"/>
+      </p:ext>
+    </p:extLst>
+  </p:cSld>
+  <p:clrMapOvr>
+    <a:masterClrMapping/>
+  </p:clrMapOvr>
+</p:sld>
+</file>
+
+<file path=ppt/slides/slide11.xml><?xml version="1.0" encoding="utf-8"?>
+<p:sld xmlns:a="http://schemas.openxmlformats.org/drawingml/2006/main" xmlns:r="http://schemas.openxmlformats.org/officeDocument/2006/relationships" xmlns:p="http://schemas.openxmlformats.org/presentationml/2006/main">
+  <p:cSld>
+    <p:spTree>
+      <p:nvGrpSpPr>
+        <p:cNvPr id="1" name=""/>
+        <p:cNvGrpSpPr/>
+        <p:nvPr/>
+      </p:nvGrpSpPr>
+      <p:grpSpPr>
+        <a:xfrm>
+          <a:off x="0" y="0"/>
+          <a:ext cx="0" cy="0"/>
+          <a:chOff x="0" y="0"/>
+          <a:chExt cx="0" cy="0"/>
+        </a:xfrm>
+      </p:grpSpPr>
+      <p:sp>
+        <p:nvSpPr>
+          <p:cNvPr id="2" name="제목 1">
+            <a:extLst>
+              <a:ext uri="{FF2B5EF4-FFF2-40B4-BE49-F238E27FC236}">
                 <a16:creationId xmlns:a16="http://schemas.microsoft.com/office/drawing/2014/main" id="{BFDD8F34-BE39-4728-9CA0-344C7E513503}"/>
               </a:ext>
             </a:extLst>
@@ -3996,7 +4180,7 @@
 </p:sld>
 </file>
 
-<file path=ppt/slides/slide11.xml><?xml version="1.0" encoding="utf-8"?>
+<file path=ppt/slides/slide12.xml><?xml version="1.0" encoding="utf-8"?>
 <p:sld xmlns:a="http://schemas.openxmlformats.org/drawingml/2006/main" xmlns:r="http://schemas.openxmlformats.org/officeDocument/2006/relationships" xmlns:p="http://schemas.openxmlformats.org/presentationml/2006/main">
   <p:cSld>
     <p:spTree>
@@ -4081,7 +4265,7 @@
 </p:sld>
 </file>
 
-<file path=ppt/slides/slide12.xml><?xml version="1.0" encoding="utf-8"?>
+<file path=ppt/slides/slide13.xml><?xml version="1.0" encoding="utf-8"?>
 <p:sld xmlns:a="http://schemas.openxmlformats.org/drawingml/2006/main" xmlns:r="http://schemas.openxmlformats.org/officeDocument/2006/relationships" xmlns:p="http://schemas.openxmlformats.org/presentationml/2006/main">
   <p:cSld>
     <p:spTree>
@@ -4200,7 +4384,7 @@
 </p:sld>
 </file>
 
-<file path=ppt/slides/slide13.xml><?xml version="1.0" encoding="utf-8"?>
+<file path=ppt/slides/slide14.xml><?xml version="1.0" encoding="utf-8"?>
 <p:sld xmlns:a="http://schemas.openxmlformats.org/drawingml/2006/main" xmlns:r="http://schemas.openxmlformats.org/officeDocument/2006/relationships" xmlns:p="http://schemas.openxmlformats.org/presentationml/2006/main">
   <p:cSld>
     <p:spTree>
@@ -6066,7 +6250,7 @@
           <p:cNvPr id="2" name="제목 1">
             <a:extLst>
               <a:ext uri="{FF2B5EF4-FFF2-40B4-BE49-F238E27FC236}">
-                <a16:creationId xmlns:a16="http://schemas.microsoft.com/office/drawing/2014/main" id="{605BC0D6-6925-44AA-849C-232855F3F726}"/>
+                <a16:creationId xmlns:a16="http://schemas.microsoft.com/office/drawing/2014/main" id="{6D6DEFB4-3C87-4020-8FB3-3E49F3051323}"/>
               </a:ext>
             </a:extLst>
           </p:cNvPr>
@@ -6083,44 +6267,14 @@
           <a:lstStyle/>
           <a:p>
             <a:r>
-              <a:rPr lang="ko-KR" altLang="en-US" dirty="0"/>
-              <a:t>비교</a:t>
-            </a:r>
-            <a:r>
               <a:rPr lang="en-US" altLang="ko-KR" dirty="0"/>
-              <a:t>(CMP)</a:t>
+              <a:t>TIMX – </a:t>
+            </a:r>
+            <a:r>
+              <a:rPr lang="ko-KR" altLang="en-US"/>
+              <a:t>기존 변환기 결과</a:t>
             </a:r>
             <a:endParaRPr lang="ko-KR" altLang="en-US" dirty="0"/>
-          </a:p>
-        </p:txBody>
-      </p:sp>
-      <p:sp>
-        <p:nvSpPr>
-          <p:cNvPr id="3" name="내용 개체 틀 2">
-            <a:extLst>
-              <a:ext uri="{FF2B5EF4-FFF2-40B4-BE49-F238E27FC236}">
-                <a16:creationId xmlns:a16="http://schemas.microsoft.com/office/drawing/2014/main" id="{EC32CFC6-7010-45B5-A261-4F9AA6C929DC}"/>
-              </a:ext>
-            </a:extLst>
-          </p:cNvPr>
-          <p:cNvSpPr>
-            <a:spLocks noGrp="1"/>
-          </p:cNvSpPr>
-          <p:nvPr>
-            <p:ph idx="1"/>
-          </p:nvPr>
-        </p:nvSpPr>
-        <p:spPr>
-          <a:xfrm>
-            <a:off x="8459282" y="1825625"/>
-            <a:ext cx="2894517" cy="4351338"/>
-          </a:xfrm>
-        </p:spPr>
-        <p:txBody>
-          <a:bodyPr/>
-          <a:lstStyle/>
-          <a:p>
-            <a:endParaRPr lang="ko-KR" altLang="en-US"/>
           </a:p>
         </p:txBody>
       </p:sp>
@@ -6129,7 +6283,7 @@
           <p:cNvPr id="4" name="그림 3">
             <a:extLst>
               <a:ext uri="{FF2B5EF4-FFF2-40B4-BE49-F238E27FC236}">
-                <a16:creationId xmlns:a16="http://schemas.microsoft.com/office/drawing/2014/main" id="{E045C605-B63E-4D62-9DE0-50C7C2418AE0}"/>
+                <a16:creationId xmlns:a16="http://schemas.microsoft.com/office/drawing/2014/main" id="{2B9B1300-0DF6-4800-B29B-BDFB7317BA78}"/>
               </a:ext>
             </a:extLst>
           </p:cNvPr>
@@ -6146,8 +6300,8 @@
         </p:blipFill>
         <p:spPr>
           <a:xfrm>
-            <a:off x="605798" y="2113395"/>
-            <a:ext cx="6734175" cy="1428750"/>
+            <a:off x="699366" y="2291361"/>
+            <a:ext cx="8886998" cy="1874505"/>
           </a:xfrm>
           <a:prstGeom prst="rect">
             <a:avLst/>
@@ -6159,7 +6313,7 @@
           <p:cNvPr id="5" name="그림 4">
             <a:extLst>
               <a:ext uri="{FF2B5EF4-FFF2-40B4-BE49-F238E27FC236}">
-                <a16:creationId xmlns:a16="http://schemas.microsoft.com/office/drawing/2014/main" id="{DF145771-F826-4CF9-A2AD-C2811936C010}"/>
+                <a16:creationId xmlns:a16="http://schemas.microsoft.com/office/drawing/2014/main" id="{23353E4F-CFDC-4BD4-99CC-BAF40FE73D7B}"/>
               </a:ext>
             </a:extLst>
           </p:cNvPr>
@@ -6176,38 +6330,8 @@
         </p:blipFill>
         <p:spPr>
           <a:xfrm>
-            <a:off x="3694340" y="3964852"/>
-            <a:ext cx="4205287" cy="2557462"/>
-          </a:xfrm>
-          <a:prstGeom prst="rect">
-            <a:avLst/>
-          </a:prstGeom>
-        </p:spPr>
-      </p:pic>
-      <p:pic>
-        <p:nvPicPr>
-          <p:cNvPr id="6" name="그림 5">
-            <a:extLst>
-              <a:ext uri="{FF2B5EF4-FFF2-40B4-BE49-F238E27FC236}">
-                <a16:creationId xmlns:a16="http://schemas.microsoft.com/office/drawing/2014/main" id="{9A23DE63-CA32-4106-B8A4-C729C522DF23}"/>
-              </a:ext>
-            </a:extLst>
-          </p:cNvPr>
-          <p:cNvPicPr>
-            <a:picLocks noChangeAspect="1"/>
-          </p:cNvPicPr>
-          <p:nvPr/>
-        </p:nvPicPr>
-        <p:blipFill>
-          <a:blip r:embed="rId4"/>
-          <a:stretch>
-            <a:fillRect/>
-          </a:stretch>
-        </p:blipFill>
-        <p:spPr>
-          <a:xfrm>
-            <a:off x="406933" y="4206584"/>
-            <a:ext cx="3007580" cy="2237783"/>
+            <a:off x="699366" y="4662689"/>
+            <a:ext cx="8707362" cy="1609053"/>
           </a:xfrm>
           <a:prstGeom prst="rect">
             <a:avLst/>
@@ -6217,7 +6341,7 @@
     </p:spTree>
     <p:extLst>
       <p:ext uri="{BB962C8B-B14F-4D97-AF65-F5344CB8AC3E}">
-        <p14:creationId xmlns:p14="http://schemas.microsoft.com/office/powerpoint/2010/main" val="1094553225"/>
+        <p14:creationId xmlns:p14="http://schemas.microsoft.com/office/powerpoint/2010/main" val="2287534317"/>
       </p:ext>
     </p:extLst>
   </p:cSld>

</xml_diff>